<commit_message>
📝 Edit ptoster file
</commit_message>
<xml_diff>
--- a/Documents/Temporary_Documents/قالب-پوستر-کارآموزی.pptx
+++ b/Documents/Temporary_Documents/قالب-پوستر-کارآموزی.pptx
@@ -2529,9 +2529,6 @@
               </a:rPr>
               <a:t> محاسبات تقریبی، موضوع جدید و مورد بحثی در طراحی دیجیتال می‌باشد که هدف از بررسی و تحقیق در این زمینه، بهبود سرعت، مساحت و توان مصرفی طرح های دیجیتال مورد استفاده در واحد های پردازشگر می‌باشد. با جایگزینی واحد های محاسباتی تقریبی با میزان خطای منطقی و قابل قبول، به جای واحد های محاسباتی دقیق ما به مزایای دیگری مانند سرعت و یا توان مصرفی کمتر دست پیدا می‌کنیم. بعد از مطالعه مقالات متعدد و تحقیقات در رابطه با عملیات های ریاضی تقریبی که این روزه در پردازنده ها و واحد های پردازشگر هوش مصنوعی و پردازش تصویر استفاده می‌شود، ما اقدام به بهبود یکی از طرح های ارائه شده در مقاله ای بین المللی کردیم و حاصل آن طراحی ضرب کننده جدیدی شد که میزان خطای آن توسط کاربر قابل کنترل می‌باشد.</a:t>
             </a:r>
-            <a:endParaRPr lang="fa-IR" sz="3600" dirty="0" smtClean="0">
-              <a:cs typeface="B Nazanin" panose="00000400000000000000" pitchFamily="2" charset="-78"/>
-            </a:endParaRPr>
           </a:p>
           <a:p>
             <a:pPr marL="228609" indent="-228609" algn="just" rtl="1">
@@ -2557,17 +2554,26 @@
               <a:rPr lang="fa-IR" sz="3600" dirty="0" smtClean="0">
                 <a:cs typeface="B Nazanin" panose="00000400000000000000" pitchFamily="2" charset="-78"/>
               </a:rPr>
-              <a:t> کردیم که از مزیای طراحی ماژولار، پایپلاین 5 مرحله ای و واحد کنترل غیر متمرکز بهره می‌برد که باعث دسترسی به فرکانس </a:t>
+              <a:t> کردیم که از مزیای طراحی ماژولار، پایپلاین 5 مرحله ای و واحد کنترل غیر متمرکز بهره می‌برد که باعث دسترسی به فرکانس 250 مگاهرتزی در پردازنده شد که عدد </a:t>
+            </a:r>
+            <a:r>
+              <a:rPr lang="fa-IR" sz="3600" smtClean="0">
+                <a:cs typeface="B Nazanin" panose="00000400000000000000" pitchFamily="2" charset="-78"/>
+              </a:rPr>
+              <a:t>قابل </a:t>
+            </a:r>
+            <a:r>
+              <a:rPr lang="fa-IR" sz="3600" smtClean="0">
+                <a:cs typeface="B Nazanin" panose="00000400000000000000" pitchFamily="2" charset="-78"/>
+              </a:rPr>
+              <a:t>قبول </a:t>
             </a:r>
             <a:r>
               <a:rPr lang="fa-IR" sz="3600" dirty="0" smtClean="0">
                 <a:cs typeface="B Nazanin" panose="00000400000000000000" pitchFamily="2" charset="-78"/>
               </a:rPr>
-              <a:t>250 مگاهرتزی در پردازنده شد که عدد قابل قول و مناسبی برای پروسسور های مصرفی در پروژه های میکروکنترلری و سیستم های نهفته می‌باشد. در نهایت ضرب کننده تقریبی در معماری پردازنده طراحی شده، قرار گرفته شد و مورد استفاده قرار گرفت.</a:t>
-            </a:r>
-            <a:endParaRPr lang="fa-IR" sz="3600" dirty="0" smtClean="0">
-              <a:cs typeface="B Nazanin" panose="00000400000000000000" pitchFamily="2" charset="-78"/>
-            </a:endParaRPr>
+              <a:t>و مناسبی برای پروسسور های مصرفی در پروژه های میکروکنترلری و سیستم های نهفته می‌باشد. در نهایت ضرب کننده تقریبی در معماری پردازنده طراحی شده، قرار گرفته شد و مورد استفاده قرار گرفت.</a:t>
+            </a:r>
           </a:p>
           <a:p>
             <a:pPr marL="228609" indent="-228609" algn="just" rtl="1">
@@ -3086,7 +3092,19 @@
               <a:rPr lang="fa-IR" sz="3600" dirty="0" smtClean="0">
                 <a:cs typeface="B Nazanin" panose="00000400000000000000" pitchFamily="2" charset="-78"/>
               </a:rPr>
-              <a:t> و اسمبلی روی پردازنده، منطبق با سیستم هامل های ویندوز و لینوکس</a:t>
+              <a:t> و اسمبلی روی پردازنده، منطبق با سیستم </a:t>
+            </a:r>
+            <a:r>
+              <a:rPr lang="fa-IR" sz="3600" dirty="0" smtClean="0">
+                <a:cs typeface="B Nazanin" panose="00000400000000000000" pitchFamily="2" charset="-78"/>
+              </a:rPr>
+              <a:t>عامل </a:t>
+            </a:r>
+            <a:r>
+              <a:rPr lang="fa-IR" sz="3600" dirty="0" smtClean="0">
+                <a:cs typeface="B Nazanin" panose="00000400000000000000" pitchFamily="2" charset="-78"/>
+              </a:rPr>
+              <a:t>های ویندوز و لینوکس</a:t>
             </a:r>
           </a:p>
           <a:p>
@@ -3107,13 +3125,7 @@
               <a:rPr lang="fa-IR" sz="3600" dirty="0" smtClean="0">
                 <a:cs typeface="B Nazanin" panose="00000400000000000000" pitchFamily="2" charset="-78"/>
               </a:rPr>
-              <a:t>سنتز، چیدمان و رسم اتصالات نهایی جهت طراحی فیزیکی </a:t>
-            </a:r>
-            <a:r>
-              <a:rPr lang="fa-IR" sz="3600" smtClean="0">
-                <a:cs typeface="B Nazanin" panose="00000400000000000000" pitchFamily="2" charset="-78"/>
-              </a:rPr>
-              <a:t>تراشه ریزپردازنده</a:t>
+              <a:t>سنتز، چیدمان و رسم اتصالات نهایی جهت طراحی فیزیکی تراشه ریزپردازنده</a:t>
             </a:r>
             <a:endParaRPr lang="fa-IR" sz="3600" dirty="0">
               <a:cs typeface="B Nazanin" panose="00000400000000000000" pitchFamily="2" charset="-78"/>
@@ -4221,13 +4233,7 @@
               <a:rPr lang="fa-IR" sz="3600" dirty="0" smtClean="0">
                 <a:cs typeface="B Nazanin" panose="00000400000000000000" pitchFamily="2" charset="-78"/>
               </a:rPr>
-              <a:t>کمبود منابع و مراجع آموزشی کامل و رایگان </a:t>
-            </a:r>
-            <a:r>
-              <a:rPr lang="fa-IR" sz="3600" dirty="0" smtClean="0">
-                <a:cs typeface="B Nazanin" panose="00000400000000000000" pitchFamily="2" charset="-78"/>
-              </a:rPr>
-              <a:t>در زمینه طراحی پردازنده</a:t>
+              <a:t>کمبود منابع و مراجع آموزشی کامل و رایگان در زمینه طراحی پردازنده</a:t>
             </a:r>
             <a:endParaRPr lang="fa-IR" sz="3600" dirty="0">
               <a:cs typeface="B Nazanin" panose="00000400000000000000" pitchFamily="2" charset="-78"/>
@@ -4249,13 +4255,7 @@
               <a:rPr lang="fa-IR" sz="3600" dirty="0" smtClean="0">
                 <a:cs typeface="B Nazanin" panose="00000400000000000000" pitchFamily="2" charset="-78"/>
               </a:rPr>
-              <a:t>عدم وجود بستر مناسب برای صنعت نیمه هادی و طراحی دیجیتال در </a:t>
-            </a:r>
-            <a:r>
-              <a:rPr lang="fa-IR" sz="3600" dirty="0" smtClean="0">
-                <a:cs typeface="B Nazanin" panose="00000400000000000000" pitchFamily="2" charset="-78"/>
-              </a:rPr>
-              <a:t>کشور، در مرحله ساخت و تولید</a:t>
+              <a:t>عدم وجود بستر مناسب برای صنعت نیمه هادی و طراحی دیجیتال در کشور، در مرحله ساخت و تولید</a:t>
             </a:r>
             <a:endParaRPr lang="fa-IR" sz="3600" dirty="0">
               <a:cs typeface="B Nazanin" panose="00000400000000000000" pitchFamily="2" charset="-78"/>
@@ -4271,19 +4271,7 @@
               <a:rPr lang="fa-IR" sz="3600" dirty="0" smtClean="0">
                 <a:cs typeface="B Nazanin" panose="00000400000000000000" pitchFamily="2" charset="-78"/>
               </a:rPr>
-              <a:t>3- عدم دسترسی به نرم افزار های تخصصی و صنعتی سنتز و </a:t>
-            </a:r>
-            <a:r>
-              <a:rPr lang="fa-IR" sz="3600" dirty="0" smtClean="0">
-                <a:cs typeface="B Nazanin" panose="00000400000000000000" pitchFamily="2" charset="-78"/>
-              </a:rPr>
-              <a:t>تبدیل </a:t>
-            </a:r>
-            <a:r>
-              <a:rPr lang="fa-IR" sz="3600" dirty="0" smtClean="0">
-                <a:cs typeface="B Nazanin" panose="00000400000000000000" pitchFamily="2" charset="-78"/>
-              </a:rPr>
-              <a:t>به مدار مجتمع فشرده</a:t>
+              <a:t>3- عدم دسترسی به نرم افزار های تخصصی و صنعتی سنتز و تبدیل به مدار مجتمع فشرده</a:t>
             </a:r>
             <a:endParaRPr lang="fa-IR" sz="3600" dirty="0">
               <a:cs typeface="B Nazanin" panose="00000400000000000000" pitchFamily="2" charset="-78"/>
@@ -4974,19 +4962,7 @@
               <a:rPr lang="fa-IR" sz="3600" dirty="0" smtClean="0">
                 <a:cs typeface="B Nazanin" panose="00000400000000000000" pitchFamily="2" charset="-78"/>
               </a:rPr>
-              <a:t>3- سنتز و تبدیل کد پردازنده به طرح </a:t>
-            </a:r>
-            <a:r>
-              <a:rPr lang="fa-IR" sz="3600" dirty="0" smtClean="0">
-                <a:cs typeface="B Nazanin" panose="00000400000000000000" pitchFamily="2" charset="-78"/>
-              </a:rPr>
-              <a:t>فیزیکی </a:t>
-            </a:r>
-            <a:r>
-              <a:rPr lang="fa-IR" sz="3600" dirty="0" smtClean="0">
-                <a:cs typeface="B Nazanin" panose="00000400000000000000" pitchFamily="2" charset="-78"/>
-              </a:rPr>
-              <a:t>تراشه با استفاده از ابزار های موجود برای انجام فرآیند </a:t>
+              <a:t>3- سنتز و تبدیل کد پردازنده به طرح فیزیکی تراشه با استفاده از ابزار های موجود برای انجام فرآیند </a:t>
             </a:r>
             <a:r>
               <a:rPr lang="en-US" sz="3600" dirty="0" smtClean="0">
@@ -5290,31 +5266,19 @@
               <a:rPr lang="fa-IR" sz="3600" dirty="0" smtClean="0">
                 <a:cs typeface="B Nazanin" panose="00000400000000000000" pitchFamily="2" charset="-78"/>
               </a:rPr>
-              <a:t> فرکانس کاری 250 مگاهرتز و قابل مقایسه با پردازنده های معروف و </a:t>
+              <a:t> فرکانس کاری 250 مگاهرتز و قابل مقایسه با پردازنده های معروف و صنعتی </a:t>
+            </a:r>
+            <a:r>
+              <a:rPr lang="en-US" sz="3600" dirty="0" smtClean="0">
+                <a:cs typeface="B Nazanin" panose="00000400000000000000" pitchFamily="2" charset="-78"/>
+              </a:rPr>
+              <a:t>ARM</a:t>
             </a:r>
             <a:r>
               <a:rPr lang="fa-IR" sz="3600" dirty="0" smtClean="0">
                 <a:cs typeface="B Nazanin" panose="00000400000000000000" pitchFamily="2" charset="-78"/>
               </a:rPr>
-              <a:t>صنعتی </a:t>
-            </a:r>
-            <a:r>
-              <a:rPr lang="en-US" sz="3600" dirty="0" smtClean="0">
-                <a:cs typeface="B Nazanin" panose="00000400000000000000" pitchFamily="2" charset="-78"/>
-              </a:rPr>
-              <a:t>ARM</a:t>
-            </a:r>
-            <a:r>
-              <a:rPr lang="fa-IR" sz="3600" dirty="0" smtClean="0">
-                <a:cs typeface="B Nazanin" panose="00000400000000000000" pitchFamily="2" charset="-78"/>
-              </a:rPr>
-              <a:t> </a:t>
-            </a:r>
-            <a:r>
-              <a:rPr lang="fa-IR" sz="3600" dirty="0" smtClean="0">
-                <a:cs typeface="B Nazanin" panose="00000400000000000000" pitchFamily="2" charset="-78"/>
-              </a:rPr>
-              <a:t>در درسته</a:t>
+              <a:t> در درسته</a:t>
             </a:r>
             <a:r>
               <a:rPr lang="en-US" sz="3600" dirty="0" smtClean="0">

</xml_diff>